<commit_message>
Update 3 Publication Traditions.pptx
</commit_message>
<xml_diff>
--- a/web/b22/3 Publication Traditions.pptx
+++ b/web/b22/3 Publication Traditions.pptx
@@ -5439,7 +5439,7 @@
         </p:nvSpPr>
         <p:spPr>
           <a:xfrm>
-            <a:off x="468313" y="1043595"/>
+            <a:off x="468313" y="1048616"/>
             <a:ext cx="8280151" cy="1521309"/>
           </a:xfrm>
           <a:noFill/>
@@ -5461,23 +5461,8 @@
                 </a:solidFill>
                 <a:cs typeface="ＭＳ Ｐゴシック" charset="0"/>
               </a:rPr>
-              <a:t>One of the most commonly used data bases to investigate citations etc. within computer </a:t>
-            </a:r>
-            <a:r>
-              <a:rPr lang="en-GB" altLang="da-DK" sz="1800" b="1" dirty="0" err="1" smtClean="0">
-                <a:solidFill>
-                  <a:srgbClr val="A50021"/>
-                </a:solidFill>
-                <a:cs typeface="ＭＳ Ｐゴシック" charset="0"/>
-              </a:rPr>
-              <a:t>sicence</a:t>
-            </a:r>
-            <a:endParaRPr lang="en-GB" altLang="da-DK" sz="1800" b="1" dirty="0" smtClean="0">
-              <a:solidFill>
-                <a:srgbClr val="A50021"/>
-              </a:solidFill>
-              <a:cs typeface="ＭＳ Ｐゴシック" charset="0"/>
-            </a:endParaRPr>
+              <a:t>One of the most commonly used data bases to investigate citations etc. within computer science</a:t>
+            </a:r>
           </a:p>
           <a:p>
             <a:pPr marL="728663" lvl="1" indent="-271463">
@@ -5701,7 +5686,15 @@
             </a:pPr>
             <a:r>
               <a:rPr lang="en-GB" altLang="da-DK" sz="1600" dirty="0" smtClean="0"/>
-              <a:t>I have only published 3 papers over the</a:t>
+              <a:t>I have only published </a:t>
+            </a:r>
+            <a:r>
+              <a:rPr lang="en-GB" altLang="da-DK" sz="1600" dirty="0" smtClean="0"/>
+              <a:t>2 </a:t>
+            </a:r>
+            <a:r>
+              <a:rPr lang="en-GB" altLang="da-DK" sz="1600" dirty="0" smtClean="0"/>
+              <a:t>papers over the</a:t>
             </a:r>
             <a:br>
               <a:rPr lang="en-GB" altLang="da-DK" sz="1600" dirty="0" smtClean="0"/>
@@ -5756,21 +5749,21 @@
       </p:sp>
       <p:grpSp>
         <p:nvGrpSpPr>
-          <p:cNvPr id="5" name="Group 4"/>
+          <p:cNvPr id="3" name="Group 2"/>
           <p:cNvGrpSpPr/>
           <p:nvPr/>
         </p:nvGrpSpPr>
         <p:grpSpPr>
           <a:xfrm>
-            <a:off x="5220072" y="2495550"/>
-            <a:ext cx="3790950" cy="3905250"/>
-            <a:chOff x="5220072" y="2495550"/>
-            <a:chExt cx="3790950" cy="3905250"/>
+            <a:off x="5436096" y="2675566"/>
+            <a:ext cx="3438128" cy="3615010"/>
+            <a:chOff x="5436096" y="2675566"/>
+            <a:chExt cx="3438128" cy="3615010"/>
           </a:xfrm>
         </p:grpSpPr>
         <p:pic>
           <p:nvPicPr>
-            <p:cNvPr id="4" name="Picture 3"/>
+            <p:cNvPr id="2" name="Picture 1"/>
             <p:cNvPicPr>
               <a:picLocks noChangeAspect="1"/>
             </p:cNvPicPr>
@@ -5784,8 +5777,8 @@
           </p:blipFill>
           <p:spPr>
             <a:xfrm>
-              <a:off x="5220072" y="2495550"/>
-              <a:ext cx="3790950" cy="3905250"/>
+              <a:off x="5436096" y="2675566"/>
+              <a:ext cx="3438128" cy="3615010"/>
             </a:xfrm>
             <a:prstGeom prst="rect">
               <a:avLst/>
@@ -5805,7 +5798,7 @@
           </p:nvSpPr>
           <p:spPr>
             <a:xfrm>
-              <a:off x="5292081" y="2660358"/>
+              <a:off x="5448389" y="2746327"/>
               <a:ext cx="1472490" cy="276999"/>
             </a:xfrm>
             <a:prstGeom prst="rect">
@@ -5875,7 +5868,7 @@
       </p:grpSpPr>
       <p:pic>
         <p:nvPicPr>
-          <p:cNvPr id="3" name="Picture 2"/>
+          <p:cNvPr id="2" name="Picture 1"/>
           <p:cNvPicPr>
             <a:picLocks noChangeAspect="1"/>
           </p:cNvPicPr>
@@ -5889,8 +5882,8 @@
         </p:blipFill>
         <p:spPr>
           <a:xfrm>
-            <a:off x="179512" y="1140141"/>
-            <a:ext cx="8706405" cy="5611673"/>
+            <a:off x="385178" y="1052736"/>
+            <a:ext cx="8373644" cy="5688632"/>
           </a:xfrm>
           <a:prstGeom prst="rect">
             <a:avLst/>
@@ -5964,7 +5957,7 @@
         </p:nvSpPr>
         <p:spPr bwMode="auto">
           <a:xfrm>
-            <a:off x="305600" y="3872839"/>
+            <a:off x="407690" y="3823914"/>
             <a:ext cx="121245" cy="73138"/>
           </a:xfrm>
           <a:prstGeom prst="rightArrow">
@@ -6078,6 +6071,30 @@
           <a:chExt cx="0" cy="0"/>
         </a:xfrm>
       </p:grpSpPr>
+      <p:pic>
+        <p:nvPicPr>
+          <p:cNvPr id="7" name="Picture 6"/>
+          <p:cNvPicPr>
+            <a:picLocks noChangeAspect="1"/>
+          </p:cNvPicPr>
+          <p:nvPr/>
+        </p:nvPicPr>
+        <p:blipFill>
+          <a:blip r:embed="rId3"/>
+          <a:stretch>
+            <a:fillRect/>
+          </a:stretch>
+        </p:blipFill>
+        <p:spPr>
+          <a:xfrm>
+            <a:off x="900361" y="2060848"/>
+            <a:ext cx="6839991" cy="4680520"/>
+          </a:xfrm>
+          <a:prstGeom prst="rect">
+            <a:avLst/>
+          </a:prstGeom>
+        </p:spPr>
+      </p:pic>
       <p:sp>
         <p:nvSpPr>
           <p:cNvPr id="10243" name="Rectangle 2"/>
@@ -6399,69 +6416,6 @@
           </a:p>
         </p:txBody>
       </p:sp>
-      <p:grpSp>
-        <p:nvGrpSpPr>
-          <p:cNvPr id="4" name="Group 3"/>
-          <p:cNvGrpSpPr/>
-          <p:nvPr/>
-        </p:nvGrpSpPr>
-        <p:grpSpPr>
-          <a:xfrm>
-            <a:off x="473914" y="1997847"/>
-            <a:ext cx="7095306" cy="4844913"/>
-            <a:chOff x="473914" y="1997847"/>
-            <a:chExt cx="7095306" cy="4844913"/>
-          </a:xfrm>
-        </p:grpSpPr>
-        <p:pic>
-          <p:nvPicPr>
-            <p:cNvPr id="2" name="Picture 1"/>
-            <p:cNvPicPr>
-              <a:picLocks noChangeAspect="1"/>
-            </p:cNvPicPr>
-            <p:nvPr/>
-          </p:nvPicPr>
-          <p:blipFill>
-            <a:blip r:embed="rId3"/>
-            <a:stretch>
-              <a:fillRect/>
-            </a:stretch>
-          </p:blipFill>
-          <p:spPr>
-            <a:xfrm>
-              <a:off x="473914" y="1997847"/>
-              <a:ext cx="7095306" cy="4781360"/>
-            </a:xfrm>
-            <a:prstGeom prst="rect">
-              <a:avLst/>
-            </a:prstGeom>
-          </p:spPr>
-        </p:pic>
-        <p:pic>
-          <p:nvPicPr>
-            <p:cNvPr id="3" name="Picture 2"/>
-            <p:cNvPicPr>
-              <a:picLocks noChangeAspect="1"/>
-            </p:cNvPicPr>
-            <p:nvPr/>
-          </p:nvPicPr>
-          <p:blipFill>
-            <a:blip r:embed="rId4"/>
-            <a:stretch>
-              <a:fillRect/>
-            </a:stretch>
-          </p:blipFill>
-          <p:spPr>
-            <a:xfrm>
-              <a:off x="726850" y="5085184"/>
-              <a:ext cx="6550250" cy="1757576"/>
-            </a:xfrm>
-            <a:prstGeom prst="rect">
-              <a:avLst/>
-            </a:prstGeom>
-          </p:spPr>
-        </p:pic>
-      </p:grpSp>
       <p:sp>
         <p:nvSpPr>
           <p:cNvPr id="6" name="TextBox 5"/>
@@ -6614,7 +6568,7 @@
         </p:nvSpPr>
         <p:spPr bwMode="auto">
           <a:xfrm rot="10800000">
-            <a:off x="6038448" y="6385780"/>
+            <a:off x="6677224" y="6412995"/>
             <a:ext cx="113504" cy="91716"/>
           </a:xfrm>
           <a:prstGeom prst="rightArrow">
@@ -6699,7 +6653,7 @@
         </p:nvSpPr>
         <p:spPr>
           <a:xfrm>
-            <a:off x="6176460" y="6301685"/>
+            <a:off x="6804248" y="6320353"/>
             <a:ext cx="539880" cy="276999"/>
           </a:xfrm>
           <a:prstGeom prst="rect">
@@ -6839,7 +6793,7 @@
       </p:grpSpPr>
       <p:pic>
         <p:nvPicPr>
-          <p:cNvPr id="18" name="Picture 17"/>
+          <p:cNvPr id="2" name="Picture 1"/>
           <p:cNvPicPr>
             <a:picLocks noChangeAspect="1"/>
           </p:cNvPicPr>
@@ -6853,8 +6807,8 @@
         </p:blipFill>
         <p:spPr>
           <a:xfrm>
-            <a:off x="465238" y="1065664"/>
-            <a:ext cx="8549222" cy="5717827"/>
+            <a:off x="476526" y="993006"/>
+            <a:ext cx="8342389" cy="5841547"/>
           </a:xfrm>
           <a:prstGeom prst="rect">
             <a:avLst/>
@@ -6869,7 +6823,7 @@
         </p:nvSpPr>
         <p:spPr>
           <a:xfrm>
-            <a:off x="2158832" y="1474997"/>
+            <a:off x="2126930" y="1439854"/>
             <a:ext cx="2363470" cy="261610"/>
           </a:xfrm>
           <a:prstGeom prst="rect">
@@ -6891,7 +6845,7 @@
                   <a:srgbClr val="5F5F5F"/>
                 </a:solidFill>
               </a:rPr>
-              <a:t>About 33.300 results (0,09 sec)</a:t>
+              <a:t>About 43.800 results (0,06 sec)</a:t>
             </a:r>
             <a:endParaRPr lang="en-US" sz="1100" b="1" dirty="0">
               <a:solidFill>
@@ -7065,8 +7019,8 @@
         </p:nvSpPr>
         <p:spPr bwMode="auto">
           <a:xfrm>
-            <a:off x="611984" y="1967670"/>
-            <a:ext cx="1199810" cy="2194520"/>
+            <a:off x="625645" y="1765800"/>
+            <a:ext cx="1265678" cy="2423246"/>
           </a:xfrm>
           <a:prstGeom prst="rect">
             <a:avLst/>
@@ -7188,7 +7142,7 @@
         </p:nvSpPr>
         <p:spPr bwMode="auto">
           <a:xfrm>
-            <a:off x="2213160" y="1201869"/>
+            <a:off x="2186867" y="1092636"/>
             <a:ext cx="1127407" cy="190729"/>
           </a:xfrm>
           <a:prstGeom prst="rect">
@@ -7273,7 +7227,7 @@
         </p:nvSpPr>
         <p:spPr bwMode="auto">
           <a:xfrm>
-            <a:off x="2183470" y="1478320"/>
+            <a:off x="2161978" y="1443229"/>
             <a:ext cx="2152310" cy="259040"/>
           </a:xfrm>
           <a:prstGeom prst="rect">
@@ -7358,7 +7312,7 @@
         </p:nvSpPr>
         <p:spPr bwMode="auto">
           <a:xfrm>
-            <a:off x="767763" y="3423994"/>
+            <a:off x="822470" y="3455256"/>
             <a:ext cx="915575" cy="162093"/>
           </a:xfrm>
           <a:prstGeom prst="rect">
@@ -7481,7 +7435,7 @@
         </p:nvSpPr>
         <p:spPr>
           <a:xfrm>
-            <a:off x="4492873" y="1119469"/>
+            <a:off x="4284756" y="1062471"/>
             <a:ext cx="2095351" cy="646331"/>
           </a:xfrm>
           <a:prstGeom prst="rect">
@@ -7517,7 +7471,7 @@
                   <a:srgbClr val="008000"/>
                 </a:solidFill>
               </a:rPr>
-              <a:t>“colored Petri nets" (US spelling) gives another 39.400 hits</a:t>
+              <a:t>“colored Petri nets" (US spelling) gives another 59.200 hits</a:t>
             </a:r>
             <a:endParaRPr lang="en-US" sz="1200" b="1" dirty="0">
               <a:solidFill>
@@ -7535,7 +7489,7 @@
         </p:nvSpPr>
         <p:spPr bwMode="auto">
           <a:xfrm rot="10800000">
-            <a:off x="4138160" y="1160387"/>
+            <a:off x="3880002" y="1109591"/>
             <a:ext cx="301861" cy="184996"/>
           </a:xfrm>
           <a:prstGeom prst="rightArrow">
@@ -7656,7 +7610,7 @@
                                           </p:stCondLst>
                                         </p:cTn>
                                         <p:tgtEl>
-                                          <p:spTgt spid="9"/>
+                                          <p:spTgt spid="16"/>
                                         </p:tgtEl>
                                         <p:attrNameLst>
                                           <p:attrName>style.visibility</p:attrName>
@@ -7683,34 +7637,7 @@
                                           </p:stCondLst>
                                         </p:cTn>
                                         <p:tgtEl>
-                                          <p:spTgt spid="10"/>
-                                        </p:tgtEl>
-                                        <p:attrNameLst>
-                                          <p:attrName>style.visibility</p:attrName>
-                                        </p:attrNameLst>
-                                      </p:cBhvr>
-                                      <p:to>
-                                        <p:strVal val="visible"/>
-                                      </p:to>
-                                    </p:set>
-                                  </p:childTnLst>
-                                </p:cTn>
-                              </p:par>
-                              <p:par>
-                                <p:cTn id="9" presetID="1" presetClass="entr" presetSubtype="0" fill="hold" grpId="0" nodeType="withEffect">
-                                  <p:stCondLst>
-                                    <p:cond delay="0"/>
-                                  </p:stCondLst>
-                                  <p:childTnLst>
-                                    <p:set>
-                                      <p:cBhvr>
-                                        <p:cTn id="10" dur="1" fill="hold">
-                                          <p:stCondLst>
-                                            <p:cond delay="0"/>
-                                          </p:stCondLst>
-                                        </p:cTn>
-                                        <p:tgtEl>
-                                          <p:spTgt spid="11"/>
+                                          <p:spTgt spid="17"/>
                                         </p:tgtEl>
                                         <p:attrNameLst>
                                           <p:attrName>style.visibility</p:attrName>
@@ -7730,19 +7657,46 @@
                     </p:cTn>
                   </p:par>
                   <p:par>
-                    <p:cTn id="11" fill="hold">
+                    <p:cTn id="9" fill="hold">
                       <p:stCondLst>
                         <p:cond delay="indefinite"/>
                       </p:stCondLst>
                       <p:childTnLst>
                         <p:par>
-                          <p:cTn id="12" fill="hold">
+                          <p:cTn id="10" fill="hold">
                             <p:stCondLst>
                               <p:cond delay="0"/>
                             </p:stCondLst>
                             <p:childTnLst>
                               <p:par>
-                                <p:cTn id="13" presetID="1" presetClass="entr" presetSubtype="0" fill="hold" grpId="0" nodeType="clickEffect">
+                                <p:cTn id="11" presetID="1" presetClass="entr" presetSubtype="0" fill="hold" grpId="0" nodeType="clickEffect">
+                                  <p:stCondLst>
+                                    <p:cond delay="0"/>
+                                  </p:stCondLst>
+                                  <p:childTnLst>
+                                    <p:set>
+                                      <p:cBhvr>
+                                        <p:cTn id="12" dur="1" fill="hold">
+                                          <p:stCondLst>
+                                            <p:cond delay="0"/>
+                                          </p:stCondLst>
+                                        </p:cTn>
+                                        <p:tgtEl>
+                                          <p:spTgt spid="9"/>
+                                        </p:tgtEl>
+                                        <p:attrNameLst>
+                                          <p:attrName>style.visibility</p:attrName>
+                                        </p:attrNameLst>
+                                      </p:cBhvr>
+                                      <p:to>
+                                        <p:strVal val="visible"/>
+                                      </p:to>
+                                    </p:set>
+                                  </p:childTnLst>
+                                </p:cTn>
+                              </p:par>
+                              <p:par>
+                                <p:cTn id="13" presetID="1" presetClass="entr" presetSubtype="0" fill="hold" grpId="0" nodeType="withEffect">
                                   <p:stCondLst>
                                     <p:cond delay="0"/>
                                   </p:stCondLst>
@@ -7755,7 +7709,7 @@
                                           </p:stCondLst>
                                         </p:cTn>
                                         <p:tgtEl>
-                                          <p:spTgt spid="14"/>
+                                          <p:spTgt spid="10"/>
                                         </p:tgtEl>
                                         <p:attrNameLst>
                                           <p:attrName>style.visibility</p:attrName>
@@ -7782,7 +7736,7 @@
                                           </p:stCondLst>
                                         </p:cTn>
                                         <p:tgtEl>
-                                          <p:spTgt spid="15"/>
+                                          <p:spTgt spid="11"/>
                                         </p:tgtEl>
                                         <p:attrNameLst>
                                           <p:attrName>style.visibility</p:attrName>
@@ -7827,7 +7781,7 @@
                                           </p:stCondLst>
                                         </p:cTn>
                                         <p:tgtEl>
-                                          <p:spTgt spid="16"/>
+                                          <p:spTgt spid="14"/>
                                         </p:tgtEl>
                                         <p:attrNameLst>
                                           <p:attrName>style.visibility</p:attrName>
@@ -7854,7 +7808,7 @@
                                           </p:stCondLst>
                                         </p:cTn>
                                         <p:tgtEl>
-                                          <p:spTgt spid="17"/>
+                                          <p:spTgt spid="15"/>
                                         </p:tgtEl>
                                         <p:attrNameLst>
                                           <p:attrName>style.visibility</p:attrName>
@@ -11425,7 +11379,25 @@
                 </a:solidFill>
                 <a:cs typeface="ＭＳ Ｐゴシック" charset="0"/>
               </a:rPr>
-              <a:t>In computer science things are different</a:t>
+              <a:t>In computer science things are </a:t>
+            </a:r>
+            <a:r>
+              <a:rPr lang="en-GB" altLang="da-DK" sz="1800" b="1" dirty="0" smtClean="0">
+                <a:solidFill>
+                  <a:srgbClr val="008000"/>
+                </a:solidFill>
+                <a:cs typeface="ＭＳ Ｐゴシック" charset="0"/>
+              </a:rPr>
+              <a:t>very</a:t>
+            </a:r>
+            <a:r>
+              <a:rPr lang="en-GB" altLang="da-DK" sz="1800" b="1" dirty="0" smtClean="0">
+                <a:solidFill>
+                  <a:srgbClr val="A50021"/>
+                </a:solidFill>
+                <a:cs typeface="ＭＳ Ｐゴシック" charset="0"/>
+              </a:rPr>
+              <a:t> different</a:t>
             </a:r>
             <a:endParaRPr lang="en-GB" altLang="da-DK" sz="1800" b="1" dirty="0" smtClean="0">
               <a:solidFill>
@@ -11988,7 +11960,7 @@
         </p:nvSpPr>
         <p:spPr>
           <a:xfrm>
-            <a:off x="468313" y="1043594"/>
+            <a:off x="468313" y="1052736"/>
             <a:ext cx="8675687" cy="5697773"/>
           </a:xfrm>
           <a:noFill/>
@@ -12090,8 +12062,28 @@
             </a:r>
             <a:r>
               <a:rPr lang="en-GB" altLang="da-DK" sz="1600" spc="-30" dirty="0" smtClean="0"/>
-              <a:t>those they believe to be the most knowledgeable within the area of the paper</a:t>
-            </a:r>
+              <a:t>those they believe to be the most knowledgeable within the area of the </a:t>
+            </a:r>
+            <a:r>
+              <a:rPr lang="en-GB" altLang="da-DK" sz="1600" spc="-30" dirty="0" smtClean="0"/>
+              <a:t>paper</a:t>
+            </a:r>
+          </a:p>
+          <a:p>
+            <a:pPr marL="728663" lvl="1" indent="-271463">
+              <a:spcBef>
+                <a:spcPts val="300"/>
+              </a:spcBef>
+            </a:pPr>
+            <a:r>
+              <a:rPr lang="en-GB" altLang="da-DK" sz="1600" spc="-30" dirty="0"/>
+              <a:t>E</a:t>
+            </a:r>
+            <a:r>
+              <a:rPr lang="en-GB" altLang="da-DK" sz="1600" spc="-30" dirty="0" smtClean="0"/>
+              <a:t>ach paper is sent to 2-4 PC-members</a:t>
+            </a:r>
+            <a:endParaRPr lang="en-GB" altLang="da-DK" sz="1600" spc="-30" dirty="0" smtClean="0"/>
           </a:p>
           <a:p>
             <a:pPr marL="728663" lvl="1" indent="-271463">
@@ -12107,7 +12099,7 @@
           <a:p>
             <a:pPr marL="271463" lvl="1" indent="-271463">
               <a:spcBef>
-                <a:spcPts val="1200"/>
+                <a:spcPts val="800"/>
               </a:spcBef>
               <a:buChar char="•"/>
             </a:pPr>
@@ -12172,7 +12164,7 @@
           <a:p>
             <a:pPr marL="271463" lvl="1" indent="-271463">
               <a:spcBef>
-                <a:spcPts val="1200"/>
+                <a:spcPts val="800"/>
               </a:spcBef>
               <a:buChar char="•"/>
             </a:pPr>

</xml_diff>